<commit_message>
přidána kontrola alokace paměti
</commit_message>
<xml_diff>
--- a/PDD-2bod.pptx
+++ b/PDD-2bod.pptx
@@ -5,14 +5,19 @@
     <p:sldMasterId id="2147483649" r:id="rId1"/>
   </p:sldMasterIdLst>
   <p:notesMasterIdLst>
-    <p:notesMasterId r:id="rId4"/>
+    <p:notesMasterId r:id="rId9"/>
   </p:notesMasterIdLst>
   <p:handoutMasterIdLst>
-    <p:handoutMasterId r:id="rId5"/>
+    <p:handoutMasterId r:id="rId10"/>
   </p:handoutMasterIdLst>
   <p:sldIdLst>
     <p:sldId id="256" r:id="rId2"/>
-    <p:sldId id="274" r:id="rId3"/>
+    <p:sldId id="275" r:id="rId3"/>
+    <p:sldId id="276" r:id="rId4"/>
+    <p:sldId id="274" r:id="rId5"/>
+    <p:sldId id="277" r:id="rId6"/>
+    <p:sldId id="278" r:id="rId7"/>
+    <p:sldId id="279" r:id="rId8"/>
   </p:sldIdLst>
   <p:sldSz cx="9144000" cy="6858000" type="screen4x3"/>
   <p:notesSz cx="6858000" cy="9144000"/>
@@ -5623,7 +5628,7 @@
           <a:p>
             <a:r>
               <a:rPr lang="cs-CZ" dirty="0" smtClean="0"/>
-              <a:t>Podvzorkování datasetu</a:t>
+              <a:t>Smysl projektu</a:t>
             </a:r>
             <a:endParaRPr lang="cs-CZ" dirty="0"/>
           </a:p>
@@ -5631,12 +5636,12 @@
       </p:sp>
       <p:sp>
         <p:nvSpPr>
-          <p:cNvPr id="4" name="Zástupný symbol pro zápatí 3"/>
+          <p:cNvPr id="3" name="Zástupný symbol pro obsah 2"/>
           <p:cNvSpPr>
             <a:spLocks noGrp="1"/>
           </p:cNvSpPr>
           <p:nvPr>
-            <p:ph type="ftr" sz="quarter" idx="10"/>
+            <p:ph idx="1"/>
           </p:nvPr>
         </p:nvSpPr>
         <p:spPr/>
@@ -5645,26 +5650,89 @@
           <a:lstStyle/>
           <a:p>
             <a:r>
-              <a:rPr lang="en-US" altLang="cs-CZ" dirty="0" smtClean="0"/>
+              <a:rPr lang="cs-CZ" dirty="0" err="1" smtClean="0"/>
+              <a:t>Portování</a:t>
+            </a:r>
+            <a:r>
+              <a:rPr lang="cs-CZ" dirty="0" smtClean="0"/>
+              <a:t> sériové konzolové aplikace do MPI</a:t>
+            </a:r>
+          </a:p>
+          <a:p>
+            <a:r>
+              <a:rPr lang="cs-CZ" dirty="0" smtClean="0"/>
+              <a:t>3 základní operace s velkými </a:t>
+            </a:r>
+            <a:r>
+              <a:rPr lang="cs-CZ" dirty="0" err="1" smtClean="0"/>
+              <a:t>datasety</a:t>
+            </a:r>
+            <a:endParaRPr lang="cs-CZ" dirty="0" smtClean="0"/>
+          </a:p>
+          <a:p>
+            <a:pPr lvl="1"/>
+            <a:r>
+              <a:rPr lang="cs-CZ" dirty="0" smtClean="0"/>
+              <a:t>Změna rozložení dat –&gt; chunky 64</a:t>
+            </a:r>
+            <a:r>
+              <a:rPr lang="cs-CZ" baseline="30000" dirty="0" smtClean="0"/>
+              <a:t>3</a:t>
+            </a:r>
+          </a:p>
+          <a:p>
+            <a:pPr lvl="1"/>
+            <a:r>
+              <a:rPr lang="cs-CZ" dirty="0" smtClean="0"/>
+              <a:t>Podvzorkování</a:t>
+            </a:r>
+          </a:p>
+          <a:p>
+            <a:pPr lvl="1"/>
+            <a:r>
+              <a:rPr lang="cs-CZ" dirty="0" smtClean="0"/>
+              <a:t>Převod data uložených pomocí senzorové masky</a:t>
+            </a:r>
+            <a:endParaRPr lang="cs-CZ" dirty="0"/>
+          </a:p>
+        </p:txBody>
+      </p:sp>
+      <p:sp>
+        <p:nvSpPr>
+          <p:cNvPr id="4" name="Zástupný symbol pro zápatí 3"/>
+          <p:cNvSpPr>
+            <a:spLocks noGrp="1"/>
+          </p:cNvSpPr>
+          <p:nvPr>
+            <p:ph type="ftr" sz="quarter" idx="10"/>
+          </p:nvPr>
+        </p:nvSpPr>
+        <p:spPr/>
+        <p:txBody>
+          <a:bodyPr/>
+          <a:lstStyle/>
+          <a:p>
+            <a:r>
+              <a:rPr lang="cs-CZ" altLang="cs-CZ" noProof="0" smtClean="0"/>
               <a:t>Distribuovaný</a:t>
             </a:r>
             <a:r>
-              <a:rPr lang="en-US" altLang="cs-CZ" dirty="0" smtClean="0"/>
+              <a:rPr lang="en-US" altLang="cs-CZ" smtClean="0"/>
               <a:t> post-processing </a:t>
             </a:r>
             <a:r>
-              <a:rPr lang="en-US" altLang="cs-CZ" dirty="0" smtClean="0"/>
+              <a:rPr lang="cs-CZ" altLang="cs-CZ" noProof="0" smtClean="0"/>
               <a:t>vizualizačních</a:t>
             </a:r>
             <a:r>
-              <a:rPr lang="en-US" altLang="cs-CZ" dirty="0" smtClean="0"/>
+              <a:rPr lang="en-US" altLang="cs-CZ" smtClean="0"/>
               <a:t> </a:t>
             </a:r>
             <a:r>
-              <a:rPr lang="en-US" altLang="cs-CZ" dirty="0" smtClean="0"/>
+              <a:rPr lang="cs-CZ" altLang="cs-CZ" noProof="0" smtClean="0"/>
               <a:t>dat</a:t>
             </a:r>
-            <a:endParaRPr lang="en-US" altLang="cs-CZ" dirty="0"/>
+            <a:endParaRPr lang="cs-CZ" altLang="cs-CZ" noProof="0" dirty="0"/>
           </a:p>
         </p:txBody>
       </p:sp>
@@ -5687,6 +5755,271 @@
               <a:rPr lang="en-US" altLang="cs-CZ" smtClean="0"/>
               <a:pPr/>
               <a:t>2</a:t>
+            </a:fld>
+            <a:endParaRPr lang="en-US" altLang="cs-CZ" dirty="0"/>
+          </a:p>
+        </p:txBody>
+      </p:sp>
+    </p:spTree>
+    <p:extLst>
+      <p:ext uri="{BB962C8B-B14F-4D97-AF65-F5344CB8AC3E}">
+        <p14:creationId xmlns:p14="http://schemas.microsoft.com/office/powerpoint/2010/main" val="164740382"/>
+      </p:ext>
+    </p:extLst>
+  </p:cSld>
+  <p:clrMapOvr>
+    <a:masterClrMapping/>
+  </p:clrMapOvr>
+</p:sld>
+</file>
+
+<file path=ppt/slides/slide3.xml><?xml version="1.0" encoding="utf-8"?>
+<p:sld xmlns:a="http://schemas.openxmlformats.org/drawingml/2006/main" xmlns:r="http://schemas.openxmlformats.org/officeDocument/2006/relationships" xmlns:p="http://schemas.openxmlformats.org/presentationml/2006/main">
+  <p:cSld>
+    <p:spTree>
+      <p:nvGrpSpPr>
+        <p:cNvPr id="1" name=""/>
+        <p:cNvGrpSpPr/>
+        <p:nvPr/>
+      </p:nvGrpSpPr>
+      <p:grpSpPr>
+        <a:xfrm>
+          <a:off x="0" y="0"/>
+          <a:ext cx="0" cy="0"/>
+          <a:chOff x="0" y="0"/>
+          <a:chExt cx="0" cy="0"/>
+        </a:xfrm>
+      </p:grpSpPr>
+      <p:sp>
+        <p:nvSpPr>
+          <p:cNvPr id="2" name="Nadpis 1"/>
+          <p:cNvSpPr>
+            <a:spLocks noGrp="1"/>
+          </p:cNvSpPr>
+          <p:nvPr>
+            <p:ph type="title"/>
+          </p:nvPr>
+        </p:nvSpPr>
+        <p:spPr/>
+        <p:txBody>
+          <a:bodyPr/>
+          <a:lstStyle/>
+          <a:p>
+            <a:r>
+              <a:rPr lang="cs-CZ" dirty="0" smtClean="0"/>
+              <a:t>Implementace</a:t>
+            </a:r>
+            <a:endParaRPr lang="cs-CZ" dirty="0"/>
+          </a:p>
+        </p:txBody>
+      </p:sp>
+      <p:sp>
+        <p:nvSpPr>
+          <p:cNvPr id="3" name="Zástupný symbol pro obsah 2"/>
+          <p:cNvSpPr>
+            <a:spLocks noGrp="1"/>
+          </p:cNvSpPr>
+          <p:nvPr>
+            <p:ph idx="1"/>
+          </p:nvPr>
+        </p:nvSpPr>
+        <p:spPr/>
+        <p:txBody>
+          <a:bodyPr/>
+          <a:lstStyle/>
+          <a:p>
+            <a:r>
+              <a:rPr lang="cs-CZ" dirty="0" smtClean="0"/>
+              <a:t>Aplikace přepsána pro využití paralelní HDF5 knihovny</a:t>
+            </a:r>
+          </a:p>
+          <a:p>
+            <a:r>
+              <a:rPr lang="cs-CZ" dirty="0" smtClean="0"/>
+              <a:t>Změna rozložení a </a:t>
+            </a:r>
+            <a:r>
+              <a:rPr lang="cs-CZ" dirty="0" err="1" smtClean="0"/>
+              <a:t>podvzorkování</a:t>
+            </a:r>
+            <a:r>
+              <a:rPr lang="cs-CZ" dirty="0" smtClean="0"/>
+              <a:t> – OK</a:t>
+            </a:r>
+          </a:p>
+          <a:p>
+            <a:r>
+              <a:rPr lang="cs-CZ" dirty="0" smtClean="0"/>
+              <a:t>Převod pomocí senzorové masky – obtížné, nelze řešit jednoduše</a:t>
+            </a:r>
+          </a:p>
+          <a:p>
+            <a:r>
+              <a:rPr lang="cs-CZ" dirty="0" smtClean="0"/>
+              <a:t>Testováno na Anselmu</a:t>
+            </a:r>
+            <a:endParaRPr lang="cs-CZ" dirty="0"/>
+          </a:p>
+        </p:txBody>
+      </p:sp>
+      <p:sp>
+        <p:nvSpPr>
+          <p:cNvPr id="4" name="Zástupný symbol pro zápatí 3"/>
+          <p:cNvSpPr>
+            <a:spLocks noGrp="1"/>
+          </p:cNvSpPr>
+          <p:nvPr>
+            <p:ph type="ftr" sz="quarter" idx="10"/>
+          </p:nvPr>
+        </p:nvSpPr>
+        <p:spPr/>
+        <p:txBody>
+          <a:bodyPr/>
+          <a:lstStyle/>
+          <a:p>
+            <a:r>
+              <a:rPr lang="cs-CZ" altLang="cs-CZ" noProof="0" smtClean="0"/>
+              <a:t>Distribuovaný</a:t>
+            </a:r>
+            <a:r>
+              <a:rPr lang="en-US" altLang="cs-CZ" smtClean="0"/>
+              <a:t> post-processing </a:t>
+            </a:r>
+            <a:r>
+              <a:rPr lang="cs-CZ" altLang="cs-CZ" noProof="0" smtClean="0"/>
+              <a:t>vizualizačních</a:t>
+            </a:r>
+            <a:r>
+              <a:rPr lang="en-US" altLang="cs-CZ" smtClean="0"/>
+              <a:t> </a:t>
+            </a:r>
+            <a:r>
+              <a:rPr lang="cs-CZ" altLang="cs-CZ" noProof="0" smtClean="0"/>
+              <a:t>dat</a:t>
+            </a:r>
+            <a:endParaRPr lang="cs-CZ" altLang="cs-CZ" noProof="0" dirty="0"/>
+          </a:p>
+        </p:txBody>
+      </p:sp>
+      <p:sp>
+        <p:nvSpPr>
+          <p:cNvPr id="5" name="Zástupný symbol pro číslo snímku 4"/>
+          <p:cNvSpPr>
+            <a:spLocks noGrp="1"/>
+          </p:cNvSpPr>
+          <p:nvPr>
+            <p:ph type="sldNum" sz="quarter" idx="11"/>
+          </p:nvPr>
+        </p:nvSpPr>
+        <p:spPr/>
+        <p:txBody>
+          <a:bodyPr/>
+          <a:lstStyle/>
+          <a:p>
+            <a:fld id="{7A7C8EF0-02FD-40B5-BB0A-5D3ED24F57E9}" type="slidenum">
+              <a:rPr lang="en-US" altLang="cs-CZ" smtClean="0"/>
+              <a:pPr/>
+              <a:t>3</a:t>
+            </a:fld>
+            <a:endParaRPr lang="en-US" altLang="cs-CZ" dirty="0"/>
+          </a:p>
+        </p:txBody>
+      </p:sp>
+    </p:spTree>
+    <p:extLst>
+      <p:ext uri="{BB962C8B-B14F-4D97-AF65-F5344CB8AC3E}">
+        <p14:creationId xmlns:p14="http://schemas.microsoft.com/office/powerpoint/2010/main" val="1150873153"/>
+      </p:ext>
+    </p:extLst>
+  </p:cSld>
+  <p:clrMapOvr>
+    <a:masterClrMapping/>
+  </p:clrMapOvr>
+</p:sld>
+</file>
+
+<file path=ppt/slides/slide4.xml><?xml version="1.0" encoding="utf-8"?>
+<p:sld xmlns:a="http://schemas.openxmlformats.org/drawingml/2006/main" xmlns:r="http://schemas.openxmlformats.org/officeDocument/2006/relationships" xmlns:p="http://schemas.openxmlformats.org/presentationml/2006/main">
+  <p:cSld>
+    <p:spTree>
+      <p:nvGrpSpPr>
+        <p:cNvPr id="1" name=""/>
+        <p:cNvGrpSpPr/>
+        <p:nvPr/>
+      </p:nvGrpSpPr>
+      <p:grpSpPr>
+        <a:xfrm>
+          <a:off x="0" y="0"/>
+          <a:ext cx="0" cy="0"/>
+          <a:chOff x="0" y="0"/>
+          <a:chExt cx="0" cy="0"/>
+        </a:xfrm>
+      </p:grpSpPr>
+      <p:sp>
+        <p:nvSpPr>
+          <p:cNvPr id="2" name="Nadpis 1"/>
+          <p:cNvSpPr>
+            <a:spLocks noGrp="1"/>
+          </p:cNvSpPr>
+          <p:nvPr>
+            <p:ph type="title"/>
+          </p:nvPr>
+        </p:nvSpPr>
+        <p:spPr/>
+        <p:txBody>
+          <a:bodyPr/>
+          <a:lstStyle/>
+          <a:p>
+            <a:r>
+              <a:rPr lang="cs-CZ" dirty="0" smtClean="0"/>
+              <a:t>Podvzorkování datasetu</a:t>
+            </a:r>
+            <a:endParaRPr lang="cs-CZ" dirty="0"/>
+          </a:p>
+        </p:txBody>
+      </p:sp>
+      <p:sp>
+        <p:nvSpPr>
+          <p:cNvPr id="4" name="Zástupný symbol pro zápatí 3"/>
+          <p:cNvSpPr>
+            <a:spLocks noGrp="1"/>
+          </p:cNvSpPr>
+          <p:nvPr>
+            <p:ph type="ftr" sz="quarter" idx="10"/>
+          </p:nvPr>
+        </p:nvSpPr>
+        <p:spPr/>
+        <p:txBody>
+          <a:bodyPr/>
+          <a:lstStyle/>
+          <a:p>
+            <a:r>
+              <a:rPr lang="en-US" altLang="cs-CZ" dirty="0" smtClean="0"/>
+              <a:t>Distribuovaný post-processing vizualizačních dat</a:t>
+            </a:r>
+            <a:endParaRPr lang="en-US" altLang="cs-CZ" dirty="0"/>
+          </a:p>
+        </p:txBody>
+      </p:sp>
+      <p:sp>
+        <p:nvSpPr>
+          <p:cNvPr id="5" name="Zástupný symbol pro číslo snímku 4"/>
+          <p:cNvSpPr>
+            <a:spLocks noGrp="1"/>
+          </p:cNvSpPr>
+          <p:nvPr>
+            <p:ph type="sldNum" sz="quarter" idx="11"/>
+          </p:nvPr>
+        </p:nvSpPr>
+        <p:spPr/>
+        <p:txBody>
+          <a:bodyPr/>
+          <a:lstStyle/>
+          <a:p>
+            <a:fld id="{7A7C8EF0-02FD-40B5-BB0A-5D3ED24F57E9}" type="slidenum">
+              <a:rPr lang="en-US" altLang="cs-CZ" smtClean="0"/>
+              <a:pPr/>
+              <a:t>4</a:t>
             </a:fld>
             <a:endParaRPr lang="en-US" altLang="cs-CZ" dirty="0"/>
           </a:p>
@@ -5714,7 +6047,7 @@
           <a:graphicData uri="http://schemas.openxmlformats.org/presentationml/2006/ole">
             <mc:AlternateContent xmlns:mc="http://schemas.openxmlformats.org/markup-compatibility/2006">
               <mc:Choice xmlns:v="urn:schemas-microsoft-com:vml" Requires="v">
-                <p:oleObj spid="_x0000_s1062" name="Acrobat Document" r:id="rId3" imgW="5629214" imgH="5162333" progId="Acrobat.Document.11">
+                <p:oleObj spid="_x0000_s1092" name="Acrobat Document" r:id="rId3" imgW="5629214" imgH="5162333" progId="Acrobat.Document.11">
                   <p:embed/>
                 </p:oleObj>
               </mc:Choice>
@@ -5771,7 +6104,7 @@
           <a:graphicData uri="http://schemas.openxmlformats.org/presentationml/2006/ole">
             <mc:AlternateContent xmlns:mc="http://schemas.openxmlformats.org/markup-compatibility/2006">
               <mc:Choice xmlns:v="urn:schemas-microsoft-com:vml" Requires="v">
-                <p:oleObj spid="_x0000_s1063" name="Acrobat Document" r:id="rId5" imgW="5629214" imgH="5162333" progId="Acrobat.Document.11">
+                <p:oleObj spid="_x0000_s1093" name="Acrobat Document" r:id="rId5" imgW="5629214" imgH="5162333" progId="Acrobat.Document.11">
                   <p:embed/>
                 </p:oleObj>
               </mc:Choice>
@@ -5828,7 +6161,7 @@
           <a:graphicData uri="http://schemas.openxmlformats.org/presentationml/2006/ole">
             <mc:AlternateContent xmlns:mc="http://schemas.openxmlformats.org/markup-compatibility/2006">
               <mc:Choice xmlns:v="urn:schemas-microsoft-com:vml" Requires="v">
-                <p:oleObj spid="_x0000_s1064" name="Acrobat Document" r:id="rId7" imgW="5629214" imgH="5162333" progId="Acrobat.Document.11">
+                <p:oleObj spid="_x0000_s1094" name="Acrobat Document" r:id="rId7" imgW="5629214" imgH="5162333" progId="Acrobat.Document.11">
                   <p:embed/>
                 </p:oleObj>
               </mc:Choice>
@@ -5872,20 +6205,20 @@
           <p:nvPr>
             <p:extLst>
               <p:ext uri="{D42A27DB-BD31-4B8C-83A1-F6EECF244321}">
-                <p14:modId xmlns:p14="http://schemas.microsoft.com/office/powerpoint/2010/main" val="1419730554"/>
+                <p14:modId xmlns:p14="http://schemas.microsoft.com/office/powerpoint/2010/main" val="3493398590"/>
               </p:ext>
             </p:extLst>
           </p:nvPr>
         </p:nvGraphicFramePr>
         <p:xfrm>
-          <a:off x="290530" y="3368971"/>
+          <a:off x="290530" y="3213271"/>
           <a:ext cx="2806704" cy="2574000"/>
         </p:xfrm>
         <a:graphic>
           <a:graphicData uri="http://schemas.openxmlformats.org/presentationml/2006/ole">
             <mc:AlternateContent xmlns:mc="http://schemas.openxmlformats.org/markup-compatibility/2006">
               <mc:Choice xmlns:v="urn:schemas-microsoft-com:vml" Requires="v">
-                <p:oleObj spid="_x0000_s1065" name="Acrobat Document" r:id="rId9" imgW="5629214" imgH="5162333" progId="Acrobat.Document.11">
+                <p:oleObj spid="_x0000_s1095" name="Acrobat Document" r:id="rId9" imgW="5629214" imgH="5162333" progId="Acrobat.Document.11">
                   <p:embed/>
                 </p:oleObj>
               </mc:Choice>
@@ -5906,7 +6239,7 @@
                     </p:blipFill>
                     <p:spPr>
                       <a:xfrm>
-                        <a:off x="290530" y="3368971"/>
+                        <a:off x="290530" y="3213271"/>
                         <a:ext cx="2806704" cy="2574000"/>
                       </a:xfrm>
                       <a:prstGeom prst="rect">
@@ -5929,20 +6262,20 @@
           <p:nvPr>
             <p:extLst>
               <p:ext uri="{D42A27DB-BD31-4B8C-83A1-F6EECF244321}">
-                <p14:modId xmlns:p14="http://schemas.microsoft.com/office/powerpoint/2010/main" val="519431757"/>
+                <p14:modId xmlns:p14="http://schemas.microsoft.com/office/powerpoint/2010/main" val="3639354636"/>
               </p:ext>
             </p:extLst>
           </p:nvPr>
         </p:nvGraphicFramePr>
         <p:xfrm>
-          <a:off x="3332168" y="3368971"/>
+          <a:off x="3332168" y="3213271"/>
           <a:ext cx="2806704" cy="2574000"/>
         </p:xfrm>
         <a:graphic>
           <a:graphicData uri="http://schemas.openxmlformats.org/presentationml/2006/ole">
             <mc:AlternateContent xmlns:mc="http://schemas.openxmlformats.org/markup-compatibility/2006">
               <mc:Choice xmlns:v="urn:schemas-microsoft-com:vml" Requires="v">
-                <p:oleObj spid="_x0000_s1066" name="Acrobat Document" r:id="rId11" imgW="5629214" imgH="5162333" progId="Acrobat.Document.11">
+                <p:oleObj spid="_x0000_s1096" name="Acrobat Document" r:id="rId11" imgW="5629214" imgH="5162333" progId="Acrobat.Document.11">
                   <p:embed/>
                 </p:oleObj>
               </mc:Choice>
@@ -5963,7 +6296,7 @@
                     </p:blipFill>
                     <p:spPr>
                       <a:xfrm>
-                        <a:off x="3332168" y="3368971"/>
+                        <a:off x="3332168" y="3213271"/>
                         <a:ext cx="2806704" cy="2574000"/>
                       </a:xfrm>
                       <a:prstGeom prst="rect">
@@ -5986,20 +6319,20 @@
           <p:nvPr>
             <p:extLst>
               <p:ext uri="{D42A27DB-BD31-4B8C-83A1-F6EECF244321}">
-                <p14:modId xmlns:p14="http://schemas.microsoft.com/office/powerpoint/2010/main" val="3693349358"/>
+                <p14:modId xmlns:p14="http://schemas.microsoft.com/office/powerpoint/2010/main" val="11383244"/>
               </p:ext>
             </p:extLst>
           </p:nvPr>
         </p:nvGraphicFramePr>
         <p:xfrm>
-          <a:off x="6373807" y="3368676"/>
+          <a:off x="6373807" y="3212976"/>
           <a:ext cx="2806705" cy="2574000"/>
         </p:xfrm>
         <a:graphic>
           <a:graphicData uri="http://schemas.openxmlformats.org/presentationml/2006/ole">
             <mc:AlternateContent xmlns:mc="http://schemas.openxmlformats.org/markup-compatibility/2006">
               <mc:Choice xmlns:v="urn:schemas-microsoft-com:vml" Requires="v">
-                <p:oleObj spid="_x0000_s1067" name="Acrobat Document" r:id="rId13" imgW="5629214" imgH="5162333" progId="Acrobat.Document.11">
+                <p:oleObj spid="_x0000_s1097" name="Acrobat Document" r:id="rId13" imgW="5629214" imgH="5162333" progId="Acrobat.Document.11">
                   <p:embed/>
                 </p:oleObj>
               </mc:Choice>
@@ -6020,7 +6353,7 @@
                     </p:blipFill>
                     <p:spPr>
                       <a:xfrm>
-                        <a:off x="6373807" y="3368676"/>
+                        <a:off x="6373807" y="3212976"/>
                         <a:ext cx="2806705" cy="2574000"/>
                       </a:xfrm>
                       <a:prstGeom prst="rect">
@@ -6042,7 +6375,7 @@
         </p:nvSpPr>
         <p:spPr>
           <a:xfrm>
-            <a:off x="99938" y="3140968"/>
+            <a:off x="99938" y="2996952"/>
             <a:ext cx="2806703" cy="584775"/>
           </a:xfrm>
           <a:prstGeom prst="rect">
@@ -6089,7 +6422,7 @@
         </p:nvSpPr>
         <p:spPr>
           <a:xfrm>
-            <a:off x="3128192" y="3140968"/>
+            <a:off x="3128192" y="2996952"/>
             <a:ext cx="2806703" cy="584775"/>
           </a:xfrm>
           <a:prstGeom prst="rect">
@@ -6136,7 +6469,7 @@
         </p:nvSpPr>
         <p:spPr>
           <a:xfrm>
-            <a:off x="6180358" y="3140968"/>
+            <a:off x="6180358" y="2996952"/>
             <a:ext cx="2806703" cy="584775"/>
           </a:xfrm>
           <a:prstGeom prst="rect">
@@ -6183,8 +6516,8 @@
         </p:nvSpPr>
         <p:spPr>
           <a:xfrm>
-            <a:off x="137535" y="5838980"/>
-            <a:ext cx="2806703" cy="584775"/>
+            <a:off x="137535" y="5661248"/>
+            <a:ext cx="2806703" cy="830997"/>
           </a:xfrm>
           <a:prstGeom prst="rect">
             <a:avLst/>
@@ -6223,6 +6556,28 @@
               <a:t>MPI_Gatherv</a:t>
             </a:r>
             <a:r>
+              <a:rPr lang="cs-CZ" sz="1600" dirty="0">
+                <a:solidFill>
+                  <a:schemeClr val="accent4">
+                    <a:lumMod val="85000"/>
+                    <a:lumOff val="15000"/>
+                  </a:schemeClr>
+                </a:solidFill>
+              </a:rPr>
+              <a:t>/ </a:t>
+            </a:r>
+            <a:r>
+              <a:rPr lang="cs-CZ" sz="1600" dirty="0" err="1" smtClean="0">
+                <a:solidFill>
+                  <a:schemeClr val="accent4">
+                    <a:lumMod val="85000"/>
+                    <a:lumOff val="15000"/>
+                  </a:schemeClr>
+                </a:solidFill>
+              </a:rPr>
+              <a:t>MPI_Alltoallv</a:t>
+            </a:r>
+            <a:r>
               <a:rPr lang="cs-CZ" sz="1600" dirty="0" smtClean="0">
                 <a:solidFill>
                   <a:schemeClr val="accent4">
@@ -6252,7 +6607,7 @@
         </p:nvSpPr>
         <p:spPr>
           <a:xfrm>
-            <a:off x="3168647" y="5838980"/>
+            <a:off x="3168647" y="5661248"/>
             <a:ext cx="2806703" cy="584775"/>
           </a:xfrm>
           <a:prstGeom prst="rect">
@@ -6299,7 +6654,7 @@
         </p:nvSpPr>
         <p:spPr>
           <a:xfrm>
-            <a:off x="6220813" y="5838980"/>
+            <a:off x="6220813" y="5661248"/>
             <a:ext cx="2806703" cy="584775"/>
           </a:xfrm>
           <a:prstGeom prst="rect">
@@ -6355,6 +6710,647 @@
       </p:par>
     </p:tnLst>
   </p:timing>
+</p:sld>
+</file>
+
+<file path=ppt/slides/slide5.xml><?xml version="1.0" encoding="utf-8"?>
+<p:sld xmlns:a="http://schemas.openxmlformats.org/drawingml/2006/main" xmlns:r="http://schemas.openxmlformats.org/officeDocument/2006/relationships" xmlns:p="http://schemas.openxmlformats.org/presentationml/2006/main">
+  <p:cSld>
+    <p:spTree>
+      <p:nvGrpSpPr>
+        <p:cNvPr id="1" name=""/>
+        <p:cNvGrpSpPr/>
+        <p:nvPr/>
+      </p:nvGrpSpPr>
+      <p:grpSpPr>
+        <a:xfrm>
+          <a:off x="0" y="0"/>
+          <a:ext cx="0" cy="0"/>
+          <a:chOff x="0" y="0"/>
+          <a:chExt cx="0" cy="0"/>
+        </a:xfrm>
+      </p:grpSpPr>
+      <p:sp>
+        <p:nvSpPr>
+          <p:cNvPr id="2" name="Nadpis 1"/>
+          <p:cNvSpPr>
+            <a:spLocks noGrp="1"/>
+          </p:cNvSpPr>
+          <p:nvPr>
+            <p:ph type="title"/>
+          </p:nvPr>
+        </p:nvSpPr>
+        <p:spPr/>
+        <p:txBody>
+          <a:bodyPr/>
+          <a:lstStyle/>
+          <a:p>
+            <a:r>
+              <a:rPr lang="cs-CZ" dirty="0" smtClean="0"/>
+              <a:t>Podvzorkování datasetu</a:t>
+            </a:r>
+            <a:endParaRPr lang="cs-CZ" dirty="0"/>
+          </a:p>
+        </p:txBody>
+      </p:sp>
+      <p:sp>
+        <p:nvSpPr>
+          <p:cNvPr id="3" name="Zástupný symbol pro obsah 2"/>
+          <p:cNvSpPr>
+            <a:spLocks noGrp="1"/>
+          </p:cNvSpPr>
+          <p:nvPr>
+            <p:ph idx="1"/>
+          </p:nvPr>
+        </p:nvSpPr>
+        <p:spPr/>
+        <p:txBody>
+          <a:bodyPr/>
+          <a:lstStyle/>
+          <a:p>
+            <a:r>
+              <a:rPr lang="cs-CZ" dirty="0" smtClean="0"/>
+              <a:t>S </a:t>
+            </a:r>
+            <a:r>
+              <a:rPr lang="cs-CZ" sz="2800" dirty="0" err="1" smtClean="0">
+                <a:solidFill>
+                  <a:schemeClr val="accent4">
+                    <a:lumMod val="85000"/>
+                    <a:lumOff val="15000"/>
+                  </a:schemeClr>
+                </a:solidFill>
+              </a:rPr>
+              <a:t>MPI_Gatherv</a:t>
+            </a:r>
+            <a:r>
+              <a:rPr lang="cs-CZ" sz="2800" dirty="0" smtClean="0">
+                <a:solidFill>
+                  <a:schemeClr val="accent4">
+                    <a:lumMod val="85000"/>
+                    <a:lumOff val="15000"/>
+                  </a:schemeClr>
+                </a:solidFill>
+              </a:rPr>
+              <a:t> pro každou desku pomalé na větším množství jader</a:t>
+            </a:r>
+          </a:p>
+          <a:p>
+            <a:r>
+              <a:rPr lang="cs-CZ" sz="2800" dirty="0" err="1" smtClean="0">
+                <a:solidFill>
+                  <a:schemeClr val="accent4">
+                    <a:lumMod val="85000"/>
+                    <a:lumOff val="15000"/>
+                  </a:schemeClr>
+                </a:solidFill>
+              </a:rPr>
+              <a:t>MPI_Gather</a:t>
+            </a:r>
+            <a:r>
+              <a:rPr lang="cs-CZ" sz="2800" dirty="0" err="1" smtClean="0">
+                <a:solidFill>
+                  <a:srgbClr val="C00000"/>
+                </a:solidFill>
+              </a:rPr>
+              <a:t>v</a:t>
+            </a:r>
+            <a:r>
+              <a:rPr lang="cs-CZ" sz="2800" dirty="0" smtClean="0">
+                <a:solidFill>
+                  <a:schemeClr val="accent4">
+                    <a:lumMod val="85000"/>
+                    <a:lumOff val="15000"/>
+                  </a:schemeClr>
+                </a:solidFill>
+              </a:rPr>
+              <a:t> nahrazeno </a:t>
+            </a:r>
+            <a:r>
+              <a:rPr lang="cs-CZ" sz="2800" dirty="0" err="1" smtClean="0">
+                <a:solidFill>
+                  <a:schemeClr val="accent4">
+                    <a:lumMod val="85000"/>
+                    <a:lumOff val="15000"/>
+                  </a:schemeClr>
+                </a:solidFill>
+              </a:rPr>
+              <a:t>MPI_Alltoall</a:t>
+            </a:r>
+            <a:r>
+              <a:rPr lang="cs-CZ" sz="2800" dirty="0" err="1" smtClean="0">
+                <a:solidFill>
+                  <a:srgbClr val="C00000"/>
+                </a:solidFill>
+              </a:rPr>
+              <a:t>v</a:t>
+            </a:r>
+            <a:r>
+              <a:rPr lang="cs-CZ" sz="2800" dirty="0" smtClean="0">
+                <a:solidFill>
+                  <a:schemeClr val="accent4">
+                    <a:lumMod val="85000"/>
+                    <a:lumOff val="15000"/>
+                  </a:schemeClr>
+                </a:solidFill>
+              </a:rPr>
+              <a:t> a přeskládání po deskách provedeno lokálně – rychlejší</a:t>
+            </a:r>
+          </a:p>
+          <a:p>
+            <a:r>
+              <a:rPr lang="cs-CZ" sz="2800" dirty="0" smtClean="0">
+                <a:solidFill>
+                  <a:schemeClr val="accent4">
+                    <a:lumMod val="85000"/>
+                    <a:lumOff val="15000"/>
+                  </a:schemeClr>
+                </a:solidFill>
+              </a:rPr>
+              <a:t>Možná optimalizace – používat </a:t>
+            </a:r>
+            <a:r>
+              <a:rPr lang="cs-CZ" sz="2800" dirty="0" err="1" smtClean="0">
+                <a:solidFill>
+                  <a:schemeClr val="accent4">
+                    <a:lumMod val="85000"/>
+                    <a:lumOff val="15000"/>
+                  </a:schemeClr>
+                </a:solidFill>
+              </a:rPr>
+              <a:t>MPI_AlltoAll</a:t>
+            </a:r>
+            <a:endParaRPr lang="cs-CZ" sz="2800" dirty="0" smtClean="0">
+              <a:solidFill>
+                <a:schemeClr val="accent4">
+                  <a:lumMod val="85000"/>
+                  <a:lumOff val="15000"/>
+                </a:schemeClr>
+              </a:solidFill>
+            </a:endParaRPr>
+          </a:p>
+          <a:p>
+            <a:r>
+              <a:rPr lang="cs-CZ" sz="2800" dirty="0" smtClean="0">
+                <a:solidFill>
+                  <a:schemeClr val="accent4">
+                    <a:lumMod val="85000"/>
+                    <a:lumOff val="15000"/>
+                  </a:schemeClr>
+                </a:solidFill>
+              </a:rPr>
+              <a:t>Jiná možná budoucí optimalizace – přeposílání pouze sousedních </a:t>
+            </a:r>
+            <a:r>
+              <a:rPr lang="cs-CZ" sz="2800" dirty="0" err="1" smtClean="0">
+                <a:solidFill>
+                  <a:schemeClr val="accent4">
+                    <a:lumMod val="85000"/>
+                    <a:lumOff val="15000"/>
+                  </a:schemeClr>
+                </a:solidFill>
+              </a:rPr>
+              <a:t>voxelů</a:t>
+            </a:r>
+            <a:r>
+              <a:rPr lang="cs-CZ" sz="2800" dirty="0" smtClean="0">
+                <a:solidFill>
+                  <a:schemeClr val="accent4">
+                    <a:lumMod val="85000"/>
+                    <a:lumOff val="15000"/>
+                  </a:schemeClr>
+                </a:solidFill>
+              </a:rPr>
+              <a:t> – mělo by být rychlejší</a:t>
+            </a:r>
+          </a:p>
+        </p:txBody>
+      </p:sp>
+      <p:sp>
+        <p:nvSpPr>
+          <p:cNvPr id="4" name="Zástupný symbol pro zápatí 3"/>
+          <p:cNvSpPr>
+            <a:spLocks noGrp="1"/>
+          </p:cNvSpPr>
+          <p:nvPr>
+            <p:ph type="ftr" sz="quarter" idx="10"/>
+          </p:nvPr>
+        </p:nvSpPr>
+        <p:spPr/>
+        <p:txBody>
+          <a:bodyPr/>
+          <a:lstStyle/>
+          <a:p>
+            <a:r>
+              <a:rPr lang="cs-CZ" altLang="cs-CZ" noProof="0" smtClean="0"/>
+              <a:t>Distribuovaný</a:t>
+            </a:r>
+            <a:r>
+              <a:rPr lang="en-US" altLang="cs-CZ" smtClean="0"/>
+              <a:t> post-processing </a:t>
+            </a:r>
+            <a:r>
+              <a:rPr lang="cs-CZ" altLang="cs-CZ" noProof="0" smtClean="0"/>
+              <a:t>vizualizačních</a:t>
+            </a:r>
+            <a:r>
+              <a:rPr lang="en-US" altLang="cs-CZ" smtClean="0"/>
+              <a:t> </a:t>
+            </a:r>
+            <a:r>
+              <a:rPr lang="cs-CZ" altLang="cs-CZ" noProof="0" smtClean="0"/>
+              <a:t>dat</a:t>
+            </a:r>
+            <a:endParaRPr lang="cs-CZ" altLang="cs-CZ" noProof="0" dirty="0"/>
+          </a:p>
+        </p:txBody>
+      </p:sp>
+      <p:sp>
+        <p:nvSpPr>
+          <p:cNvPr id="5" name="Zástupný symbol pro číslo snímku 4"/>
+          <p:cNvSpPr>
+            <a:spLocks noGrp="1"/>
+          </p:cNvSpPr>
+          <p:nvPr>
+            <p:ph type="sldNum" sz="quarter" idx="11"/>
+          </p:nvPr>
+        </p:nvSpPr>
+        <p:spPr/>
+        <p:txBody>
+          <a:bodyPr/>
+          <a:lstStyle/>
+          <a:p>
+            <a:fld id="{7A7C8EF0-02FD-40B5-BB0A-5D3ED24F57E9}" type="slidenum">
+              <a:rPr lang="en-US" altLang="cs-CZ" smtClean="0"/>
+              <a:pPr/>
+              <a:t>5</a:t>
+            </a:fld>
+            <a:endParaRPr lang="en-US" altLang="cs-CZ" dirty="0"/>
+          </a:p>
+        </p:txBody>
+      </p:sp>
+    </p:spTree>
+    <p:extLst>
+      <p:ext uri="{BB962C8B-B14F-4D97-AF65-F5344CB8AC3E}">
+        <p14:creationId xmlns:p14="http://schemas.microsoft.com/office/powerpoint/2010/main" val="1062504651"/>
+      </p:ext>
+    </p:extLst>
+  </p:cSld>
+  <p:clrMapOvr>
+    <a:masterClrMapping/>
+  </p:clrMapOvr>
+</p:sld>
+</file>
+
+<file path=ppt/slides/slide6.xml><?xml version="1.0" encoding="utf-8"?>
+<p:sld xmlns:a="http://schemas.openxmlformats.org/drawingml/2006/main" xmlns:r="http://schemas.openxmlformats.org/officeDocument/2006/relationships" xmlns:p="http://schemas.openxmlformats.org/presentationml/2006/main">
+  <p:cSld>
+    <p:spTree>
+      <p:nvGrpSpPr>
+        <p:cNvPr id="1" name=""/>
+        <p:cNvGrpSpPr/>
+        <p:nvPr/>
+      </p:nvGrpSpPr>
+      <p:grpSpPr>
+        <a:xfrm>
+          <a:off x="0" y="0"/>
+          <a:ext cx="0" cy="0"/>
+          <a:chOff x="0" y="0"/>
+          <a:chExt cx="0" cy="0"/>
+        </a:xfrm>
+      </p:grpSpPr>
+      <p:sp>
+        <p:nvSpPr>
+          <p:cNvPr id="2" name="Nadpis 1"/>
+          <p:cNvSpPr>
+            <a:spLocks noGrp="1"/>
+          </p:cNvSpPr>
+          <p:nvPr>
+            <p:ph type="title"/>
+          </p:nvPr>
+        </p:nvSpPr>
+        <p:spPr/>
+        <p:txBody>
+          <a:bodyPr/>
+          <a:lstStyle/>
+          <a:p>
+            <a:r>
+              <a:rPr lang="cs-CZ" dirty="0" smtClean="0"/>
+              <a:t>Testování</a:t>
+            </a:r>
+            <a:endParaRPr lang="cs-CZ" dirty="0"/>
+          </a:p>
+        </p:txBody>
+      </p:sp>
+      <p:sp>
+        <p:nvSpPr>
+          <p:cNvPr id="3" name="Zástupný symbol pro obsah 2"/>
+          <p:cNvSpPr>
+            <a:spLocks noGrp="1"/>
+          </p:cNvSpPr>
+          <p:nvPr>
+            <p:ph idx="1"/>
+          </p:nvPr>
+        </p:nvSpPr>
+        <p:spPr/>
+        <p:txBody>
+          <a:bodyPr/>
+          <a:lstStyle/>
+          <a:p>
+            <a:r>
+              <a:rPr lang="cs-CZ" dirty="0" smtClean="0"/>
+              <a:t>Rychlost čtení/zápisu dat se s časem hodně mění (i v řádech několika s)</a:t>
+            </a:r>
+          </a:p>
+          <a:p>
+            <a:r>
+              <a:rPr lang="cs-CZ" dirty="0" smtClean="0"/>
+              <a:t>Lepší je nastavovat  v Lustre větší </a:t>
+            </a:r>
+            <a:r>
+              <a:rPr lang="cs-CZ" dirty="0" err="1" smtClean="0"/>
+              <a:t>stripe</a:t>
+            </a:r>
+            <a:r>
+              <a:rPr lang="cs-CZ" dirty="0" smtClean="0"/>
+              <a:t>, (kopírovaní souboru)</a:t>
+            </a:r>
+          </a:p>
+          <a:p>
+            <a:r>
+              <a:rPr lang="cs-CZ" dirty="0" smtClean="0"/>
+              <a:t>Data 1024</a:t>
+            </a:r>
+            <a:r>
+              <a:rPr lang="cs-CZ" baseline="30000" dirty="0" smtClean="0"/>
+              <a:t>3</a:t>
+            </a:r>
+            <a:r>
+              <a:rPr lang="cs-CZ" dirty="0" smtClean="0"/>
+              <a:t>, </a:t>
+            </a:r>
+            <a:r>
+              <a:rPr lang="cs-CZ" dirty="0" err="1" smtClean="0"/>
+              <a:t>stripe</a:t>
+            </a:r>
+            <a:r>
+              <a:rPr lang="cs-CZ" dirty="0" smtClean="0"/>
+              <a:t> 1024x1024x64x4 B</a:t>
+            </a:r>
+          </a:p>
+          <a:p>
+            <a:r>
+              <a:rPr lang="cs-CZ" dirty="0" smtClean="0"/>
+              <a:t>Nejrychlejší načtení celého datasetu cca 1s</a:t>
+            </a:r>
+            <a:endParaRPr lang="cs-CZ" dirty="0"/>
+          </a:p>
+        </p:txBody>
+      </p:sp>
+      <p:sp>
+        <p:nvSpPr>
+          <p:cNvPr id="4" name="Zástupný symbol pro zápatí 3"/>
+          <p:cNvSpPr>
+            <a:spLocks noGrp="1"/>
+          </p:cNvSpPr>
+          <p:nvPr>
+            <p:ph type="ftr" sz="quarter" idx="10"/>
+          </p:nvPr>
+        </p:nvSpPr>
+        <p:spPr/>
+        <p:txBody>
+          <a:bodyPr/>
+          <a:lstStyle/>
+          <a:p>
+            <a:r>
+              <a:rPr lang="cs-CZ" altLang="cs-CZ" noProof="0" smtClean="0"/>
+              <a:t>Distribuovaný</a:t>
+            </a:r>
+            <a:r>
+              <a:rPr lang="en-US" altLang="cs-CZ" smtClean="0"/>
+              <a:t> post-processing </a:t>
+            </a:r>
+            <a:r>
+              <a:rPr lang="cs-CZ" altLang="cs-CZ" noProof="0" smtClean="0"/>
+              <a:t>vizualizačních</a:t>
+            </a:r>
+            <a:r>
+              <a:rPr lang="en-US" altLang="cs-CZ" smtClean="0"/>
+              <a:t> </a:t>
+            </a:r>
+            <a:r>
+              <a:rPr lang="cs-CZ" altLang="cs-CZ" noProof="0" smtClean="0"/>
+              <a:t>dat</a:t>
+            </a:r>
+            <a:endParaRPr lang="cs-CZ" altLang="cs-CZ" noProof="0" dirty="0"/>
+          </a:p>
+        </p:txBody>
+      </p:sp>
+      <p:sp>
+        <p:nvSpPr>
+          <p:cNvPr id="5" name="Zástupný symbol pro číslo snímku 4"/>
+          <p:cNvSpPr>
+            <a:spLocks noGrp="1"/>
+          </p:cNvSpPr>
+          <p:nvPr>
+            <p:ph type="sldNum" sz="quarter" idx="11"/>
+          </p:nvPr>
+        </p:nvSpPr>
+        <p:spPr/>
+        <p:txBody>
+          <a:bodyPr/>
+          <a:lstStyle/>
+          <a:p>
+            <a:fld id="{7A7C8EF0-02FD-40B5-BB0A-5D3ED24F57E9}" type="slidenum">
+              <a:rPr lang="en-US" altLang="cs-CZ" smtClean="0"/>
+              <a:pPr/>
+              <a:t>6</a:t>
+            </a:fld>
+            <a:endParaRPr lang="en-US" altLang="cs-CZ" dirty="0"/>
+          </a:p>
+        </p:txBody>
+      </p:sp>
+    </p:spTree>
+    <p:extLst>
+      <p:ext uri="{BB962C8B-B14F-4D97-AF65-F5344CB8AC3E}">
+        <p14:creationId xmlns:p14="http://schemas.microsoft.com/office/powerpoint/2010/main" val="431979016"/>
+      </p:ext>
+    </p:extLst>
+  </p:cSld>
+  <p:clrMapOvr>
+    <a:masterClrMapping/>
+  </p:clrMapOvr>
+</p:sld>
+</file>
+
+<file path=ppt/slides/slide7.xml><?xml version="1.0" encoding="utf-8"?>
+<p:sld xmlns:a="http://schemas.openxmlformats.org/drawingml/2006/main" xmlns:r="http://schemas.openxmlformats.org/officeDocument/2006/relationships" xmlns:p="http://schemas.openxmlformats.org/presentationml/2006/main">
+  <p:cSld>
+    <p:spTree>
+      <p:nvGrpSpPr>
+        <p:cNvPr id="1" name=""/>
+        <p:cNvGrpSpPr/>
+        <p:nvPr/>
+      </p:nvGrpSpPr>
+      <p:grpSpPr>
+        <a:xfrm>
+          <a:off x="0" y="0"/>
+          <a:ext cx="0" cy="0"/>
+          <a:chOff x="0" y="0"/>
+          <a:chExt cx="0" cy="0"/>
+        </a:xfrm>
+      </p:grpSpPr>
+      <p:sp>
+        <p:nvSpPr>
+          <p:cNvPr id="2" name="Nadpis 1"/>
+          <p:cNvSpPr>
+            <a:spLocks noGrp="1"/>
+          </p:cNvSpPr>
+          <p:nvPr>
+            <p:ph type="title"/>
+          </p:nvPr>
+        </p:nvSpPr>
+        <p:spPr/>
+        <p:txBody>
+          <a:bodyPr/>
+          <a:lstStyle/>
+          <a:p>
+            <a:r>
+              <a:rPr lang="cs-CZ" dirty="0" smtClean="0"/>
+              <a:t>Co dál?</a:t>
+            </a:r>
+            <a:endParaRPr lang="cs-CZ" dirty="0"/>
+          </a:p>
+        </p:txBody>
+      </p:sp>
+      <p:sp>
+        <p:nvSpPr>
+          <p:cNvPr id="3" name="Zástupný symbol pro obsah 2"/>
+          <p:cNvSpPr>
+            <a:spLocks noGrp="1"/>
+          </p:cNvSpPr>
+          <p:nvPr>
+            <p:ph idx="1"/>
+          </p:nvPr>
+        </p:nvSpPr>
+        <p:spPr/>
+        <p:txBody>
+          <a:bodyPr/>
+          <a:lstStyle/>
+          <a:p>
+            <a:r>
+              <a:rPr lang="cs-CZ" dirty="0" smtClean="0"/>
+              <a:t>Závěrečná zpráva</a:t>
+            </a:r>
+          </a:p>
+          <a:p>
+            <a:r>
+              <a:rPr lang="cs-CZ" dirty="0" smtClean="0"/>
+              <a:t>Podvzorkování s využitím sousedních dat</a:t>
+            </a:r>
+          </a:p>
+          <a:p>
+            <a:r>
+              <a:rPr lang="cs-CZ" dirty="0" smtClean="0"/>
+              <a:t>Měřit na větších datech (2048</a:t>
+            </a:r>
+            <a:r>
+              <a:rPr lang="cs-CZ" baseline="30000" dirty="0" smtClean="0"/>
+              <a:t>3</a:t>
+            </a:r>
+            <a:r>
+              <a:rPr lang="cs-CZ" dirty="0" smtClean="0"/>
+              <a:t>)</a:t>
+            </a:r>
+          </a:p>
+          <a:p>
+            <a:r>
+              <a:rPr lang="cs-CZ" dirty="0" smtClean="0"/>
+              <a:t>Více jader</a:t>
+            </a:r>
+          </a:p>
+          <a:p>
+            <a:r>
+              <a:rPr lang="cs-CZ" smtClean="0"/>
+              <a:t>Více měření</a:t>
+            </a:r>
+            <a:endParaRPr lang="cs-CZ" dirty="0"/>
+          </a:p>
+        </p:txBody>
+      </p:sp>
+      <p:sp>
+        <p:nvSpPr>
+          <p:cNvPr id="4" name="Zástupný symbol pro zápatí 3"/>
+          <p:cNvSpPr>
+            <a:spLocks noGrp="1"/>
+          </p:cNvSpPr>
+          <p:nvPr>
+            <p:ph type="ftr" sz="quarter" idx="10"/>
+          </p:nvPr>
+        </p:nvSpPr>
+        <p:spPr/>
+        <p:txBody>
+          <a:bodyPr/>
+          <a:lstStyle/>
+          <a:p>
+            <a:r>
+              <a:rPr lang="cs-CZ" altLang="cs-CZ" noProof="0" smtClean="0"/>
+              <a:t>Distribuovaný</a:t>
+            </a:r>
+            <a:r>
+              <a:rPr lang="en-US" altLang="cs-CZ" smtClean="0"/>
+              <a:t> post-processing </a:t>
+            </a:r>
+            <a:r>
+              <a:rPr lang="cs-CZ" altLang="cs-CZ" noProof="0" smtClean="0"/>
+              <a:t>vizualizačních</a:t>
+            </a:r>
+            <a:r>
+              <a:rPr lang="en-US" altLang="cs-CZ" smtClean="0"/>
+              <a:t> </a:t>
+            </a:r>
+            <a:r>
+              <a:rPr lang="cs-CZ" altLang="cs-CZ" noProof="0" smtClean="0"/>
+              <a:t>dat</a:t>
+            </a:r>
+            <a:endParaRPr lang="cs-CZ" altLang="cs-CZ" noProof="0" dirty="0"/>
+          </a:p>
+        </p:txBody>
+      </p:sp>
+      <p:sp>
+        <p:nvSpPr>
+          <p:cNvPr id="5" name="Zástupný symbol pro číslo snímku 4"/>
+          <p:cNvSpPr>
+            <a:spLocks noGrp="1"/>
+          </p:cNvSpPr>
+          <p:nvPr>
+            <p:ph type="sldNum" sz="quarter" idx="11"/>
+          </p:nvPr>
+        </p:nvSpPr>
+        <p:spPr/>
+        <p:txBody>
+          <a:bodyPr/>
+          <a:lstStyle/>
+          <a:p>
+            <a:fld id="{7A7C8EF0-02FD-40B5-BB0A-5D3ED24F57E9}" type="slidenum">
+              <a:rPr lang="en-US" altLang="cs-CZ" smtClean="0"/>
+              <a:pPr/>
+              <a:t>7</a:t>
+            </a:fld>
+            <a:endParaRPr lang="en-US" altLang="cs-CZ" dirty="0"/>
+          </a:p>
+        </p:txBody>
+      </p:sp>
+    </p:spTree>
+    <p:extLst>
+      <p:ext uri="{BB962C8B-B14F-4D97-AF65-F5344CB8AC3E}">
+        <p14:creationId xmlns:p14="http://schemas.microsoft.com/office/powerpoint/2010/main" val="3758201439"/>
+      </p:ext>
+    </p:extLst>
+  </p:cSld>
+  <p:clrMapOvr>
+    <a:masterClrMapping/>
+  </p:clrMapOvr>
 </p:sld>
 </file>
 

</xml_diff>